<commit_message>
Update Introsort RIBO-02-20 Tikhonov A..pptx
</commit_message>
<xml_diff>
--- a/dz5/Introsort RIBO-02-20 Tikhonov A..pptx
+++ b/dz5/Introsort RIBO-02-20 Tikhonov A..pptx
@@ -5,7 +5,7 @@
     <p:sldMasterId id="2147483660" r:id="rId1"/>
   </p:sldMasterIdLst>
   <p:notesMasterIdLst>
-    <p:notesMasterId r:id="rId11"/>
+    <p:notesMasterId r:id="rId12"/>
   </p:notesMasterIdLst>
   <p:sldIdLst>
     <p:sldId id="256" r:id="rId2"/>
@@ -17,6 +17,7 @@
     <p:sldId id="261" r:id="rId8"/>
     <p:sldId id="262" r:id="rId9"/>
     <p:sldId id="264" r:id="rId10"/>
+    <p:sldId id="265" r:id="rId11"/>
   </p:sldIdLst>
   <p:sldSz cx="12192000" cy="6858000"/>
   <p:notesSz cx="6858000" cy="9144000"/>
@@ -115,6 +116,11 @@
       </a:defRPr>
     </a:lvl9pPr>
   </p:defaultTextStyle>
+  <p:extLst>
+    <p:ext uri="{EFAFB233-063F-42B5-8137-9DF3F51BA10A}">
+      <p15:sldGuideLst xmlns:p15="http://schemas.microsoft.com/office/powerpoint/2012/main"/>
+    </p:ext>
+  </p:extLst>
 </p:presentation>
 </file>
 
@@ -637,7 +643,7 @@
           <a:p>
             <a:fld id="{6AE1D323-4985-41DC-B270-A7B7F04EE1B5}" type="datetimeFigureOut">
               <a:rPr lang="ru-RU" smtClean="0"/>
-              <a:t>08/04/21</a:t>
+              <a:t>09/04/21</a:t>
             </a:fld>
             <a:endParaRPr lang="ru-RU"/>
           </a:p>
@@ -967,7 +973,7 @@
           <a:p>
             <a:fld id="{6AE1D323-4985-41DC-B270-A7B7F04EE1B5}" type="datetimeFigureOut">
               <a:rPr lang="ru-RU" smtClean="0"/>
-              <a:t>08/04/21</a:t>
+              <a:t>09/04/21</a:t>
             </a:fld>
             <a:endParaRPr lang="ru-RU"/>
           </a:p>
@@ -1147,7 +1153,7 @@
           <a:p>
             <a:fld id="{6AE1D323-4985-41DC-B270-A7B7F04EE1B5}" type="datetimeFigureOut">
               <a:rPr lang="ru-RU" smtClean="0"/>
-              <a:t>08/04/21</a:t>
+              <a:t>09/04/21</a:t>
             </a:fld>
             <a:endParaRPr lang="ru-RU"/>
           </a:p>
@@ -1317,7 +1323,7 @@
           <a:p>
             <a:fld id="{6AE1D323-4985-41DC-B270-A7B7F04EE1B5}" type="datetimeFigureOut">
               <a:rPr lang="ru-RU" smtClean="0"/>
-              <a:t>08/04/21</a:t>
+              <a:t>09/04/21</a:t>
             </a:fld>
             <a:endParaRPr lang="ru-RU"/>
           </a:p>
@@ -1594,7 +1600,7 @@
           <a:p>
             <a:fld id="{6AE1D323-4985-41DC-B270-A7B7F04EE1B5}" type="datetimeFigureOut">
               <a:rPr lang="ru-RU" smtClean="0"/>
-              <a:t>08/04/21</a:t>
+              <a:t>09/04/21</a:t>
             </a:fld>
             <a:endParaRPr lang="ru-RU"/>
           </a:p>
@@ -1988,7 +1994,7 @@
           <a:p>
             <a:fld id="{6AE1D323-4985-41DC-B270-A7B7F04EE1B5}" type="datetimeFigureOut">
               <a:rPr lang="ru-RU" smtClean="0"/>
-              <a:t>08/04/21</a:t>
+              <a:t>09/04/21</a:t>
             </a:fld>
             <a:endParaRPr lang="ru-RU"/>
           </a:p>
@@ -2465,7 +2471,7 @@
           <a:p>
             <a:fld id="{6AE1D323-4985-41DC-B270-A7B7F04EE1B5}" type="datetimeFigureOut">
               <a:rPr lang="ru-RU" smtClean="0"/>
-              <a:t>08/04/21</a:t>
+              <a:t>09/04/21</a:t>
             </a:fld>
             <a:endParaRPr lang="ru-RU"/>
           </a:p>
@@ -2583,7 +2589,7 @@
           <a:p>
             <a:fld id="{6AE1D323-4985-41DC-B270-A7B7F04EE1B5}" type="datetimeFigureOut">
               <a:rPr lang="ru-RU" smtClean="0"/>
-              <a:t>08/04/21</a:t>
+              <a:t>09/04/21</a:t>
             </a:fld>
             <a:endParaRPr lang="ru-RU"/>
           </a:p>
@@ -2678,7 +2684,7 @@
           <a:p>
             <a:fld id="{6AE1D323-4985-41DC-B270-A7B7F04EE1B5}" type="datetimeFigureOut">
               <a:rPr lang="ru-RU" smtClean="0"/>
-              <a:t>08/04/21</a:t>
+              <a:t>09/04/21</a:t>
             </a:fld>
             <a:endParaRPr lang="ru-RU"/>
           </a:p>
@@ -3024,7 +3030,7 @@
           <a:p>
             <a:fld id="{6AE1D323-4985-41DC-B270-A7B7F04EE1B5}" type="datetimeFigureOut">
               <a:rPr lang="ru-RU" smtClean="0"/>
-              <a:t>08/04/21</a:t>
+              <a:t>09/04/21</a:t>
             </a:fld>
             <a:endParaRPr lang="ru-RU"/>
           </a:p>
@@ -3412,7 +3418,7 @@
           <a:p>
             <a:fld id="{6AE1D323-4985-41DC-B270-A7B7F04EE1B5}" type="datetimeFigureOut">
               <a:rPr lang="ru-RU" smtClean="0"/>
-              <a:t>08/04/21</a:t>
+              <a:t>09/04/21</a:t>
             </a:fld>
             <a:endParaRPr lang="ru-RU"/>
           </a:p>
@@ -3690,7 +3696,7 @@
           <a:p>
             <a:fld id="{6AE1D323-4985-41DC-B270-A7B7F04EE1B5}" type="datetimeFigureOut">
               <a:rPr lang="ru-RU" smtClean="0"/>
-              <a:t>08/04/21</a:t>
+              <a:t>09/04/21</a:t>
             </a:fld>
             <a:endParaRPr lang="ru-RU"/>
           </a:p>
@@ -4309,6 +4315,439 @@
 </p:sld>
 </file>
 
+<file path=ppt/slides/slide10.xml><?xml version="1.0" encoding="utf-8"?>
+<p:sld xmlns:a="http://schemas.openxmlformats.org/drawingml/2006/main" xmlns:r="http://schemas.openxmlformats.org/officeDocument/2006/relationships" xmlns:p="http://schemas.openxmlformats.org/presentationml/2006/main">
+  <p:cSld>
+    <p:spTree>
+      <p:nvGrpSpPr>
+        <p:cNvPr id="1" name=""/>
+        <p:cNvGrpSpPr/>
+        <p:nvPr/>
+      </p:nvGrpSpPr>
+      <p:grpSpPr>
+        <a:xfrm>
+          <a:off x="0" y="0"/>
+          <a:ext cx="0" cy="0"/>
+          <a:chOff x="0" y="0"/>
+          <a:chExt cx="0" cy="0"/>
+        </a:xfrm>
+      </p:grpSpPr>
+      <p:sp>
+        <p:nvSpPr>
+          <p:cNvPr id="2" name="Заголовок 1"/>
+          <p:cNvSpPr>
+            <a:spLocks noGrp="1"/>
+          </p:cNvSpPr>
+          <p:nvPr>
+            <p:ph type="title"/>
+          </p:nvPr>
+        </p:nvSpPr>
+        <p:spPr/>
+        <p:txBody>
+          <a:bodyPr>
+            <a:normAutofit/>
+          </a:bodyPr>
+          <a:lstStyle/>
+          <a:p>
+            <a:r>
+              <a:rPr lang="ru-RU" sz="4000" b="1" dirty="0"/>
+              <a:t>Может ли </a:t>
+            </a:r>
+            <a:r>
+              <a:rPr lang="en-US" sz="4000" b="1" dirty="0" err="1" smtClean="0"/>
+              <a:t>IntroSort</a:t>
+            </a:r>
+            <a:r>
+              <a:rPr lang="ru-RU" sz="4000" b="1" dirty="0" smtClean="0"/>
+              <a:t> </a:t>
+            </a:r>
+            <a:r>
+              <a:rPr lang="ru-RU" sz="4000" b="1" dirty="0"/>
+              <a:t>применяться везде?</a:t>
+            </a:r>
+            <a:endParaRPr lang="ru-RU" sz="4000" dirty="0"/>
+          </a:p>
+        </p:txBody>
+      </p:sp>
+      <p:sp>
+        <p:nvSpPr>
+          <p:cNvPr id="3" name="Объект 2"/>
+          <p:cNvSpPr>
+            <a:spLocks noGrp="1"/>
+          </p:cNvSpPr>
+          <p:nvPr>
+            <p:ph idx="1"/>
+          </p:nvPr>
+        </p:nvSpPr>
+        <p:spPr>
+          <a:xfrm>
+            <a:off x="1371600" y="1428750"/>
+            <a:ext cx="9601200" cy="3581400"/>
+          </a:xfrm>
+        </p:spPr>
+        <p:txBody>
+          <a:bodyPr/>
+          <a:lstStyle/>
+          <a:p>
+            <a:r>
+              <a:rPr lang="ru-RU" sz="2400" dirty="0"/>
+              <a:t>Если данные не помещаются в массив, </a:t>
+            </a:r>
+            <a:r>
+              <a:rPr lang="ru-RU" sz="2400" dirty="0" err="1"/>
+              <a:t>Introsort</a:t>
+            </a:r>
+            <a:r>
+              <a:rPr lang="ru-RU" sz="2400" dirty="0"/>
+              <a:t> не может быть использован.</a:t>
+            </a:r>
+          </a:p>
+          <a:p>
+            <a:r>
+              <a:rPr lang="ru-RU" sz="2400" dirty="0"/>
+              <a:t>Кроме того, как </a:t>
+            </a:r>
+            <a:r>
+              <a:rPr lang="ru-RU" sz="2400" dirty="0" err="1"/>
+              <a:t>Quicksort</a:t>
+            </a:r>
+            <a:r>
+              <a:rPr lang="ru-RU" sz="2400" dirty="0"/>
+              <a:t> и </a:t>
+            </a:r>
+            <a:r>
+              <a:rPr lang="ru-RU" sz="2400" dirty="0" err="1"/>
+              <a:t>Heapsort</a:t>
+            </a:r>
+            <a:r>
+              <a:rPr lang="ru-RU" sz="2400" dirty="0"/>
+              <a:t>, </a:t>
+            </a:r>
+            <a:r>
+              <a:rPr lang="ru-RU" sz="2400" dirty="0" err="1"/>
+              <a:t>Introsort</a:t>
+            </a:r>
+            <a:r>
+              <a:rPr lang="ru-RU" sz="2400" dirty="0"/>
+              <a:t> не является стабильным. Когда требуется стабильная сортировка, </a:t>
+            </a:r>
+            <a:r>
+              <a:rPr lang="ru-RU" sz="2400" dirty="0" err="1"/>
+              <a:t>Introsort</a:t>
+            </a:r>
+            <a:r>
+              <a:rPr lang="ru-RU" sz="2400" dirty="0"/>
+              <a:t> не может быть применен.</a:t>
+            </a:r>
+          </a:p>
+          <a:p>
+            <a:endParaRPr lang="ru-RU" dirty="0"/>
+          </a:p>
+        </p:txBody>
+      </p:sp>
+      <p:sp>
+        <p:nvSpPr>
+          <p:cNvPr id="4" name="Заголовок 1"/>
+          <p:cNvSpPr txBox="1">
+            <a:spLocks/>
+          </p:cNvSpPr>
+          <p:nvPr/>
+        </p:nvSpPr>
+        <p:spPr>
+          <a:xfrm>
+            <a:off x="1371600" y="3524250"/>
+            <a:ext cx="9601200" cy="1485900"/>
+          </a:xfrm>
+          <a:prstGeom prst="rect">
+            <a:avLst/>
+          </a:prstGeom>
+        </p:spPr>
+        <p:txBody>
+          <a:bodyPr vert="horz" lIns="91440" tIns="45720" rIns="91440" bIns="45720" rtlCol="0" anchor="t">
+            <a:normAutofit/>
+          </a:bodyPr>
+          <a:lstStyle>
+            <a:lvl1pPr algn="l" defTabSz="914400" rtl="0" eaLnBrk="1" latinLnBrk="0" hangingPunct="1">
+              <a:lnSpc>
+                <a:spcPct val="89000"/>
+              </a:lnSpc>
+              <a:spcBef>
+                <a:spcPct val="0"/>
+              </a:spcBef>
+              <a:buNone/>
+              <a:defRPr sz="4400" kern="1200" baseline="0">
+                <a:solidFill>
+                  <a:schemeClr val="tx2"/>
+                </a:solidFill>
+                <a:latin typeface="+mj-lt"/>
+                <a:ea typeface="+mj-ea"/>
+                <a:cs typeface="+mj-cs"/>
+              </a:defRPr>
+            </a:lvl1pPr>
+          </a:lstStyle>
+          <a:p>
+            <a:r>
+              <a:rPr lang="ru-RU" b="1" dirty="0"/>
+              <a:t>Является ли </a:t>
+            </a:r>
+            <a:r>
+              <a:rPr lang="ru-RU" b="1" dirty="0" err="1"/>
+              <a:t>Introsort</a:t>
+            </a:r>
+            <a:r>
+              <a:rPr lang="ru-RU" b="1" dirty="0"/>
+              <a:t> единственным гибридным алгоритмом сортировки?</a:t>
+            </a:r>
+            <a:endParaRPr lang="ru-RU" sz="4000" dirty="0"/>
+          </a:p>
+        </p:txBody>
+      </p:sp>
+      <p:sp>
+        <p:nvSpPr>
+          <p:cNvPr id="6" name="Объект 2"/>
+          <p:cNvSpPr txBox="1">
+            <a:spLocks/>
+          </p:cNvSpPr>
+          <p:nvPr/>
+        </p:nvSpPr>
+        <p:spPr>
+          <a:xfrm>
+            <a:off x="1371600" y="5010150"/>
+            <a:ext cx="9601200" cy="3581400"/>
+          </a:xfrm>
+          <a:prstGeom prst="rect">
+            <a:avLst/>
+          </a:prstGeom>
+        </p:spPr>
+        <p:txBody>
+          <a:bodyPr vert="horz" lIns="91440" tIns="45720" rIns="91440" bIns="45720" rtlCol="0">
+            <a:normAutofit/>
+          </a:bodyPr>
+          <a:lstStyle>
+            <a:lvl1pPr marL="384048" indent="-384048" algn="l" defTabSz="914400" rtl="0" eaLnBrk="1" latinLnBrk="0" hangingPunct="1">
+              <a:lnSpc>
+                <a:spcPct val="94000"/>
+              </a:lnSpc>
+              <a:spcBef>
+                <a:spcPts val="1000"/>
+              </a:spcBef>
+              <a:spcAft>
+                <a:spcPts val="200"/>
+              </a:spcAft>
+              <a:buFont typeface="Franklin Gothic Book" panose="020B0503020102020204" pitchFamily="34" charset="0"/>
+              <a:buChar char="■"/>
+              <a:defRPr sz="2000" kern="1200" baseline="0">
+                <a:solidFill>
+                  <a:schemeClr val="tx2"/>
+                </a:solidFill>
+                <a:latin typeface="+mn-lt"/>
+                <a:ea typeface="+mn-ea"/>
+                <a:cs typeface="+mn-cs"/>
+              </a:defRPr>
+            </a:lvl1pPr>
+            <a:lvl2pPr marL="914400" indent="-384048" algn="l" defTabSz="914400" rtl="0" eaLnBrk="1" latinLnBrk="0" hangingPunct="1">
+              <a:lnSpc>
+                <a:spcPct val="94000"/>
+              </a:lnSpc>
+              <a:spcBef>
+                <a:spcPts val="500"/>
+              </a:spcBef>
+              <a:spcAft>
+                <a:spcPts val="200"/>
+              </a:spcAft>
+              <a:buFont typeface="Franklin Gothic Book" panose="020B0503020102020204" pitchFamily="34" charset="0"/>
+              <a:buChar char="–"/>
+              <a:defRPr sz="2000" i="1" kern="1200" baseline="0">
+                <a:solidFill>
+                  <a:schemeClr val="tx2"/>
+                </a:solidFill>
+                <a:latin typeface="+mn-lt"/>
+                <a:ea typeface="+mn-ea"/>
+                <a:cs typeface="+mn-cs"/>
+              </a:defRPr>
+            </a:lvl2pPr>
+            <a:lvl3pPr marL="1371600" indent="-384048" algn="l" defTabSz="914400" rtl="0" eaLnBrk="1" latinLnBrk="0" hangingPunct="1">
+              <a:lnSpc>
+                <a:spcPct val="94000"/>
+              </a:lnSpc>
+              <a:spcBef>
+                <a:spcPts val="500"/>
+              </a:spcBef>
+              <a:spcAft>
+                <a:spcPts val="200"/>
+              </a:spcAft>
+              <a:buFont typeface="Franklin Gothic Book" panose="020B0503020102020204" pitchFamily="34" charset="0"/>
+              <a:buChar char="■"/>
+              <a:defRPr sz="1800" kern="1200" baseline="0">
+                <a:solidFill>
+                  <a:schemeClr val="tx2"/>
+                </a:solidFill>
+                <a:latin typeface="+mn-lt"/>
+                <a:ea typeface="+mn-ea"/>
+                <a:cs typeface="+mn-cs"/>
+              </a:defRPr>
+            </a:lvl3pPr>
+            <a:lvl4pPr marL="1828800" indent="-384048" algn="l" defTabSz="914400" rtl="0" eaLnBrk="1" latinLnBrk="0" hangingPunct="1">
+              <a:lnSpc>
+                <a:spcPct val="94000"/>
+              </a:lnSpc>
+              <a:spcBef>
+                <a:spcPts val="500"/>
+              </a:spcBef>
+              <a:spcAft>
+                <a:spcPts val="200"/>
+              </a:spcAft>
+              <a:buFont typeface="Franklin Gothic Book" panose="020B0503020102020204" pitchFamily="34" charset="0"/>
+              <a:buChar char="–"/>
+              <a:defRPr sz="1800" i="1" kern="1200" baseline="0">
+                <a:solidFill>
+                  <a:schemeClr val="tx2"/>
+                </a:solidFill>
+                <a:latin typeface="+mn-lt"/>
+                <a:ea typeface="+mn-ea"/>
+                <a:cs typeface="+mn-cs"/>
+              </a:defRPr>
+            </a:lvl4pPr>
+            <a:lvl5pPr marL="2286000" indent="-384048" algn="l" defTabSz="914400" rtl="0" eaLnBrk="1" latinLnBrk="0" hangingPunct="1">
+              <a:lnSpc>
+                <a:spcPct val="94000"/>
+              </a:lnSpc>
+              <a:spcBef>
+                <a:spcPts val="500"/>
+              </a:spcBef>
+              <a:spcAft>
+                <a:spcPts val="200"/>
+              </a:spcAft>
+              <a:buFont typeface="Franklin Gothic Book" panose="020B0503020102020204" pitchFamily="34" charset="0"/>
+              <a:buChar char="■"/>
+              <a:defRPr sz="1600" kern="1200" baseline="0">
+                <a:solidFill>
+                  <a:schemeClr val="tx2"/>
+                </a:solidFill>
+                <a:latin typeface="+mn-lt"/>
+                <a:ea typeface="+mn-ea"/>
+                <a:cs typeface="+mn-cs"/>
+              </a:defRPr>
+            </a:lvl5pPr>
+            <a:lvl6pPr marL="2743200" indent="-384048" algn="l" defTabSz="914400" rtl="0" eaLnBrk="1" latinLnBrk="0" hangingPunct="1">
+              <a:lnSpc>
+                <a:spcPct val="94000"/>
+              </a:lnSpc>
+              <a:spcBef>
+                <a:spcPts val="500"/>
+              </a:spcBef>
+              <a:spcAft>
+                <a:spcPts val="200"/>
+              </a:spcAft>
+              <a:buFont typeface="Franklin Gothic Book" panose="020B0503020102020204" pitchFamily="34" charset="0"/>
+              <a:buChar char="–"/>
+              <a:defRPr sz="1600" i="1" kern="1200" baseline="0">
+                <a:solidFill>
+                  <a:schemeClr val="tx2"/>
+                </a:solidFill>
+                <a:latin typeface="+mn-lt"/>
+                <a:ea typeface="+mn-ea"/>
+                <a:cs typeface="+mn-cs"/>
+              </a:defRPr>
+            </a:lvl6pPr>
+            <a:lvl7pPr marL="3200400" indent="-384048" algn="l" defTabSz="914400" rtl="0" eaLnBrk="1" latinLnBrk="0" hangingPunct="1">
+              <a:lnSpc>
+                <a:spcPct val="94000"/>
+              </a:lnSpc>
+              <a:spcBef>
+                <a:spcPts val="500"/>
+              </a:spcBef>
+              <a:spcAft>
+                <a:spcPts val="200"/>
+              </a:spcAft>
+              <a:buFont typeface="Franklin Gothic Book" panose="020B0503020102020204" pitchFamily="34" charset="0"/>
+              <a:buChar char="■"/>
+              <a:defRPr sz="1400" kern="1200" baseline="0">
+                <a:solidFill>
+                  <a:schemeClr val="tx2"/>
+                </a:solidFill>
+                <a:latin typeface="+mn-lt"/>
+                <a:ea typeface="+mn-ea"/>
+                <a:cs typeface="+mn-cs"/>
+              </a:defRPr>
+            </a:lvl7pPr>
+            <a:lvl8pPr marL="3657600" indent="-384048" algn="l" defTabSz="914400" rtl="0" eaLnBrk="1" latinLnBrk="0" hangingPunct="1">
+              <a:lnSpc>
+                <a:spcPct val="94000"/>
+              </a:lnSpc>
+              <a:spcBef>
+                <a:spcPts val="500"/>
+              </a:spcBef>
+              <a:spcAft>
+                <a:spcPts val="200"/>
+              </a:spcAft>
+              <a:buFont typeface="Franklin Gothic Book" panose="020B0503020102020204" pitchFamily="34" charset="0"/>
+              <a:buChar char="–"/>
+              <a:defRPr sz="1400" i="1" kern="1200" baseline="0">
+                <a:solidFill>
+                  <a:schemeClr val="tx2"/>
+                </a:solidFill>
+                <a:latin typeface="+mn-lt"/>
+                <a:ea typeface="+mn-ea"/>
+                <a:cs typeface="+mn-cs"/>
+              </a:defRPr>
+            </a:lvl8pPr>
+            <a:lvl9pPr marL="4114800" indent="-384048" algn="l" defTabSz="914400" rtl="0" eaLnBrk="1" latinLnBrk="0" hangingPunct="1">
+              <a:lnSpc>
+                <a:spcPct val="94000"/>
+              </a:lnSpc>
+              <a:spcBef>
+                <a:spcPts val="500"/>
+              </a:spcBef>
+              <a:spcAft>
+                <a:spcPts val="200"/>
+              </a:spcAft>
+              <a:buFont typeface="Franklin Gothic Book" panose="020B0503020102020204" pitchFamily="34" charset="0"/>
+              <a:buChar char="■"/>
+              <a:defRPr sz="1400" kern="1200" baseline="0">
+                <a:solidFill>
+                  <a:schemeClr val="tx2"/>
+                </a:solidFill>
+                <a:latin typeface="+mn-lt"/>
+                <a:ea typeface="+mn-ea"/>
+                <a:cs typeface="+mn-cs"/>
+              </a:defRPr>
+            </a:lvl9pPr>
+          </a:lstStyle>
+          <a:p>
+            <a:r>
+              <a:rPr lang="ru-RU" sz="2800" dirty="0"/>
+              <a:t>Нет. Существуют другие гибридные алгоритмы сортировки, такие как </a:t>
+            </a:r>
+            <a:r>
+              <a:rPr lang="en-US" sz="2800" dirty="0"/>
+              <a:t>Hybrid </a:t>
+            </a:r>
+            <a:r>
+              <a:rPr lang="en-US" sz="2800" dirty="0" err="1"/>
+              <a:t>Mergesort</a:t>
+            </a:r>
+            <a:r>
+              <a:rPr lang="en-US" sz="2800" dirty="0"/>
+              <a:t>, Tim sort, Insertion-Merge Hybrid.</a:t>
+            </a:r>
+            <a:endParaRPr lang="ru-RU" sz="2800" dirty="0"/>
+          </a:p>
+        </p:txBody>
+      </p:sp>
+    </p:spTree>
+    <p:extLst>
+      <p:ext uri="{BB962C8B-B14F-4D97-AF65-F5344CB8AC3E}">
+        <p14:creationId xmlns:p14="http://schemas.microsoft.com/office/powerpoint/2010/main" val="4055097955"/>
+      </p:ext>
+    </p:extLst>
+  </p:cSld>
+  <p:clrMapOvr>
+    <a:masterClrMapping/>
+  </p:clrMapOvr>
+</p:sld>
+</file>
+
 <file path=ppt/slides/slide2.xml><?xml version="1.0" encoding="utf-8"?>
 <p:sld xmlns:a="http://schemas.openxmlformats.org/drawingml/2006/main" xmlns:r="http://schemas.openxmlformats.org/officeDocument/2006/relationships" xmlns:p="http://schemas.openxmlformats.org/presentationml/2006/main">
   <p:cSld>
@@ -4410,7 +4849,6 @@
               <a:rPr lang="ru-RU" sz="2400" dirty="0"/>
               <a:t> n) и быстродействием, сравнимым с быстрой сортировкой. Так как оба алгоритма используют сравнения, этот алгоритм также принадлежит классу сортировок на основе сравнений.</a:t>
             </a:r>
-            <a:endParaRPr lang="ru-RU" sz="2400" dirty="0"/>
           </a:p>
         </p:txBody>
       </p:sp>

</xml_diff>